<commit_message>
minor corrections/modifications to a couple of slides
</commit_message>
<xml_diff>
--- a/PowerPoints/14 - Arrays.pptx
+++ b/PowerPoints/14 - Arrays.pptx
@@ -22,7 +22,7 @@
     <p:sldId id="258" r:id="rId10"/>
     <p:sldId id="259" r:id="rId11"/>
     <p:sldId id="269" r:id="rId12"/>
-    <p:sldId id="260" r:id="rId13"/>
+    <p:sldId id="278" r:id="rId13"/>
     <p:sldId id="277" r:id="rId14"/>
     <p:sldId id="262" r:id="rId15"/>
     <p:sldId id="263" r:id="rId16"/>
@@ -4653,21 +4653,12 @@
               <a:t>parseVariable</a:t>
             </a:r>
             <a:r>
-              <a:rPr lang="en-US" sz="2000">
-                <a:latin typeface="Consolas" pitchFamily="49" charset="0"/>
-                <a:cs typeface="Consolas" pitchFamily="49" charset="0"/>
-              </a:rPr>
-              <a:t>() : </a:t>
-            </a:r>
-            <a:r>
               <a:rPr lang="en-US" sz="2000" dirty="0">
                 <a:latin typeface="Consolas" pitchFamily="49" charset="0"/>
                 <a:cs typeface="Consolas" pitchFamily="49" charset="0"/>
               </a:rPr>
-              <a:t>Variable?</a:t>
-            </a:r>
-          </a:p>
-          <a:p>
+              <a:t>() : Variable?</a:t>
+            </a:r>
             <a:endParaRPr lang="fr-FR" sz="2000" dirty="0">
               <a:latin typeface="Consolas" pitchFamily="49" charset="0"/>
               <a:cs typeface="Consolas" pitchFamily="49" charset="0"/>
@@ -5862,18 +5853,25 @@
               </a:rPr>
               <a:t>size</a:t>
             </a:r>
+          </a:p>
+          <a:p>
+            <a:pPr lvl="2">
+              <a:buFontTx/>
+              <a:buChar char="–"/>
+            </a:pPr>
             <a:r>
               <a:rPr lang="en-US" dirty="0"/>
-              <a:t> – the size (number of bytes) of a variable with this type</a:t>
+              <a:t>the size (number of bytes) of a variable with this type;</a:t>
             </a:r>
           </a:p>
           <a:p>
             <a:pPr lvl="2">
-              <a:buNone/>
+              <a:buFontTx/>
+              <a:buChar char="–"/>
             </a:pPr>
             <a:r>
               <a:rPr lang="en-US" dirty="0"/>
-              <a:t>	        (computed as </a:t>
+              <a:t>computed as </a:t>
             </a:r>
             <a:r>
               <a:rPr lang="en-US" dirty="0" err="1">
@@ -5896,10 +5894,7 @@
               </a:rPr>
               <a:t>elementType.size</a:t>
             </a:r>
-            <a:r>
-              <a:rPr lang="en-US" dirty="0"/>
-              <a:t>)</a:t>
-            </a:r>
+            <a:endParaRPr lang="en-US" dirty="0"/>
           </a:p>
           <a:p>
             <a:endParaRPr lang="en-US" dirty="0"/>
@@ -11800,7 +11795,7 @@
                 <a:latin typeface="Consolas" pitchFamily="49" charset="0"/>
                 <a:cs typeface="Consolas" pitchFamily="49" charset="0"/>
               </a:rPr>
-              <a:t> "=" "array "</a:t>
+              <a:t> "=" "array"</a:t>
             </a:r>
           </a:p>
           <a:p>
@@ -11830,7 +11825,7 @@
                 <a:latin typeface="Consolas" pitchFamily="49" charset="0"/>
                 <a:cs typeface="Consolas" pitchFamily="49" charset="0"/>
               </a:rPr>
-              <a:t> "] " "of" </a:t>
+              <a:t> "]" "of" </a:t>
             </a:r>
             <a:r>
               <a:rPr lang="en-US" sz="1800" dirty="0" err="1">
@@ -11947,18 +11942,11 @@
               <a:t>paramId</a:t>
             </a:r>
             <a:r>
-              <a:rPr lang="en-US" sz="1800">
-                <a:latin typeface="Consolas" pitchFamily="49" charset="0"/>
-                <a:cs typeface="Consolas" pitchFamily="49" charset="0"/>
-              </a:rPr>
-              <a:t> ) </a:t>
-            </a:r>
-            <a:r>
               <a:rPr lang="en-US" sz="1800" dirty="0">
                 <a:latin typeface="Consolas" pitchFamily="49" charset="0"/>
                 <a:cs typeface="Consolas" pitchFamily="49" charset="0"/>
               </a:rPr>
-              <a:t>{ </a:t>
+              <a:t> ) { </a:t>
             </a:r>
             <a:r>
               <a:rPr lang="en-US" sz="1800" dirty="0" err="1">

</xml_diff>